<commit_message>
finished: functional router guard
</commit_message>
<xml_diff>
--- a/Angular v15.pptx
+++ b/Angular v15.pptx
@@ -3153,22 +3153,21 @@
       </p:sp>
       <p:pic>
         <p:nvPicPr>
-          <p:cNvPr id="5" name="Picture 4"/>
+          <p:cNvPr id="3" name="Picture 2"/>
           <p:cNvPicPr>
             <a:picLocks noChangeAspect="1"/>
           </p:cNvPicPr>
           <p:nvPr/>
         </p:nvPicPr>
-        <p:blipFill>
+        <p:blipFill rotWithShape="1">
           <a:blip r:embed="rId2"/>
-          <a:stretch>
-            <a:fillRect/>
-          </a:stretch>
+          <a:srcRect l="-3646" r="38051"/>
+          <a:stretch/>
         </p:blipFill>
         <p:spPr>
           <a:xfrm>
-            <a:off x="5097208" y="433197"/>
-            <a:ext cx="6734175" cy="6229350"/>
+            <a:off x="4772025" y="987425"/>
+            <a:ext cx="6391655" cy="4972050"/>
           </a:xfrm>
           <a:prstGeom prst="rect">
             <a:avLst/>
@@ -4545,7 +4544,9 @@
         </p:nvSpPr>
         <p:spPr/>
         <p:txBody>
-          <a:bodyPr/>
+          <a:bodyPr>
+            <a:normAutofit lnSpcReduction="10000"/>
+          </a:bodyPr>
           <a:lstStyle/>
           <a:p>
             <a:r>
@@ -4559,7 +4560,38 @@
           <a:p>
             <a:r>
               <a:rPr lang="en-US" dirty="0"/>
-              <a:t>We’re also on a mission to simplify the output of ng new. As a first step we reduce the configuration by removing test.ts, polyfills.ts, and environments. You can now specify your polyfills directly in angular.json in the polyfills section:</a:t>
+              <a:t>We’re also on a mission to simplify the output of ng new. As a first step we reduce the configuration by removing test.ts, polyfills.ts, and environments. You can now specify your polyfills directly in angular.json in the polyfills </a:t>
+            </a:r>
+            <a:r>
+              <a:rPr lang="en-US" dirty="0" smtClean="0"/>
+              <a:t>section:</a:t>
+            </a:r>
+          </a:p>
+          <a:p>
+            <a:pPr marL="914400" lvl="2" indent="0">
+              <a:buNone/>
+            </a:pPr>
+            <a:r>
+              <a:rPr lang="en-US" dirty="0"/>
+              <a:t>"polyfills": [</a:t>
+            </a:r>
+          </a:p>
+          <a:p>
+            <a:pPr marL="914400" lvl="2" indent="0">
+              <a:buNone/>
+            </a:pPr>
+            <a:r>
+              <a:rPr lang="en-US" dirty="0"/>
+              <a:t>  "zone.js"</a:t>
+            </a:r>
+          </a:p>
+          <a:p>
+            <a:pPr marL="914400" lvl="2" indent="0">
+              <a:buNone/>
+            </a:pPr>
+            <a:r>
+              <a:rPr lang="en-US" dirty="0"/>
+              <a:t>]</a:t>
             </a:r>
             <a:endParaRPr lang="en-US" dirty="0"/>
           </a:p>

</xml_diff>

<commit_message>
finished: directive composition api
</commit_message>
<xml_diff>
--- a/Angular v15.pptx
+++ b/Angular v15.pptx
@@ -16,11 +16,9 @@
     <p:sldId id="265" r:id="rId10"/>
     <p:sldId id="271" r:id="rId11"/>
     <p:sldId id="268" r:id="rId12"/>
-    <p:sldId id="269" r:id="rId13"/>
-    <p:sldId id="270" r:id="rId14"/>
-    <p:sldId id="272" r:id="rId15"/>
-    <p:sldId id="266" r:id="rId16"/>
-    <p:sldId id="267" r:id="rId17"/>
+    <p:sldId id="272" r:id="rId13"/>
+    <p:sldId id="266" r:id="rId14"/>
+    <p:sldId id="267" r:id="rId15"/>
   </p:sldIdLst>
   <p:sldSz cx="12192000" cy="6858000"/>
   <p:notesSz cx="6858000" cy="9144000"/>
@@ -3366,7 +3364,7 @@
           <a:p>
             <a:r>
               <a:rPr lang="en-US" b="1" dirty="0"/>
-              <a:t>Functional APIs for Router and HTTPClient</a:t>
+              <a:t>Directive Composition API</a:t>
             </a:r>
           </a:p>
         </p:txBody>
@@ -3393,7 +3391,7 @@
     </p:spTree>
     <p:extLst>
       <p:ext uri="{BB962C8B-B14F-4D97-AF65-F5344CB8AC3E}">
-        <p14:creationId xmlns:p14="http://schemas.microsoft.com/office/powerpoint/2010/main" val="2160949280"/>
+        <p14:creationId xmlns:p14="http://schemas.microsoft.com/office/powerpoint/2010/main" val="1467538808"/>
       </p:ext>
     </p:extLst>
   </p:cSld>
@@ -3437,148 +3435,6 @@
           <a:p>
             <a:r>
               <a:rPr lang="en-US" b="1" dirty="0"/>
-              <a:t>Functional HTTPClient</a:t>
-            </a:r>
-          </a:p>
-        </p:txBody>
-      </p:sp>
-      <p:sp>
-        <p:nvSpPr>
-          <p:cNvPr id="3" name="Content Placeholder 2"/>
-          <p:cNvSpPr>
-            <a:spLocks noGrp="1"/>
-          </p:cNvSpPr>
-          <p:nvPr>
-            <p:ph idx="1"/>
-          </p:nvPr>
-        </p:nvSpPr>
-        <p:spPr/>
-        <p:txBody>
-          <a:bodyPr/>
-          <a:lstStyle/>
-          <a:p>
-            <a:endParaRPr lang="en-US" dirty="0"/>
-          </a:p>
-        </p:txBody>
-      </p:sp>
-    </p:spTree>
-    <p:extLst>
-      <p:ext uri="{BB962C8B-B14F-4D97-AF65-F5344CB8AC3E}">
-        <p14:creationId xmlns:p14="http://schemas.microsoft.com/office/powerpoint/2010/main" val="2915555779"/>
-      </p:ext>
-    </p:extLst>
-  </p:cSld>
-  <p:clrMapOvr>
-    <a:masterClrMapping/>
-  </p:clrMapOvr>
-</p:sld>
-</file>
-
-<file path=ppt/slides/slide14.xml><?xml version="1.0" encoding="utf-8"?>
-<p:sld xmlns:a="http://schemas.openxmlformats.org/drawingml/2006/main" xmlns:r="http://schemas.openxmlformats.org/officeDocument/2006/relationships" xmlns:p="http://schemas.openxmlformats.org/presentationml/2006/main">
-  <p:cSld>
-    <p:spTree>
-      <p:nvGrpSpPr>
-        <p:cNvPr id="1" name=""/>
-        <p:cNvGrpSpPr/>
-        <p:nvPr/>
-      </p:nvGrpSpPr>
-      <p:grpSpPr>
-        <a:xfrm>
-          <a:off x="0" y="0"/>
-          <a:ext cx="0" cy="0"/>
-          <a:chOff x="0" y="0"/>
-          <a:chExt cx="0" cy="0"/>
-        </a:xfrm>
-      </p:grpSpPr>
-      <p:sp>
-        <p:nvSpPr>
-          <p:cNvPr id="2" name="Title 1"/>
-          <p:cNvSpPr>
-            <a:spLocks noGrp="1"/>
-          </p:cNvSpPr>
-          <p:nvPr>
-            <p:ph type="title"/>
-          </p:nvPr>
-        </p:nvSpPr>
-        <p:spPr/>
-        <p:txBody>
-          <a:bodyPr/>
-          <a:lstStyle/>
-          <a:p>
-            <a:r>
-              <a:rPr lang="en-US" b="1" dirty="0"/>
-              <a:t>Directive Composition API</a:t>
-            </a:r>
-          </a:p>
-        </p:txBody>
-      </p:sp>
-      <p:sp>
-        <p:nvSpPr>
-          <p:cNvPr id="3" name="Content Placeholder 2"/>
-          <p:cNvSpPr>
-            <a:spLocks noGrp="1"/>
-          </p:cNvSpPr>
-          <p:nvPr>
-            <p:ph idx="1"/>
-          </p:nvPr>
-        </p:nvSpPr>
-        <p:spPr/>
-        <p:txBody>
-          <a:bodyPr/>
-          <a:lstStyle/>
-          <a:p>
-            <a:endParaRPr lang="en-US" dirty="0"/>
-          </a:p>
-        </p:txBody>
-      </p:sp>
-    </p:spTree>
-    <p:extLst>
-      <p:ext uri="{BB962C8B-B14F-4D97-AF65-F5344CB8AC3E}">
-        <p14:creationId xmlns:p14="http://schemas.microsoft.com/office/powerpoint/2010/main" val="1467538808"/>
-      </p:ext>
-    </p:extLst>
-  </p:cSld>
-  <p:clrMapOvr>
-    <a:masterClrMapping/>
-  </p:clrMapOvr>
-</p:sld>
-</file>
-
-<file path=ppt/slides/slide15.xml><?xml version="1.0" encoding="utf-8"?>
-<p:sld xmlns:a="http://schemas.openxmlformats.org/drawingml/2006/main" xmlns:r="http://schemas.openxmlformats.org/officeDocument/2006/relationships" xmlns:p="http://schemas.openxmlformats.org/presentationml/2006/main">
-  <p:cSld>
-    <p:spTree>
-      <p:nvGrpSpPr>
-        <p:cNvPr id="1" name=""/>
-        <p:cNvGrpSpPr/>
-        <p:nvPr/>
-      </p:nvGrpSpPr>
-      <p:grpSpPr>
-        <a:xfrm>
-          <a:off x="0" y="0"/>
-          <a:ext cx="0" cy="0"/>
-          <a:chOff x="0" y="0"/>
-          <a:chExt cx="0" cy="0"/>
-        </a:xfrm>
-      </p:grpSpPr>
-      <p:sp>
-        <p:nvSpPr>
-          <p:cNvPr id="2" name="Title 1"/>
-          <p:cNvSpPr>
-            <a:spLocks noGrp="1"/>
-          </p:cNvSpPr>
-          <p:nvPr>
-            <p:ph type="title"/>
-          </p:nvPr>
-        </p:nvSpPr>
-        <p:spPr/>
-        <p:txBody>
-          <a:bodyPr/>
-          <a:lstStyle/>
-          <a:p>
-            <a:r>
-              <a:rPr lang="en-US" b="1" dirty="0"/>
               <a:t>Stable Standalone Components</a:t>
             </a:r>
           </a:p>
@@ -3622,7 +3478,7 @@
 </p:sld>
 </file>
 
-<file path=ppt/slides/slide16.xml><?xml version="1.0" encoding="utf-8"?>
+<file path=ppt/slides/slide14.xml><?xml version="1.0" encoding="utf-8"?>
 <p:sld xmlns:a="http://schemas.openxmlformats.org/drawingml/2006/main" xmlns:r="http://schemas.openxmlformats.org/officeDocument/2006/relationships" xmlns:p="http://schemas.openxmlformats.org/presentationml/2006/main">
   <p:cSld>
     <p:spTree>

</xml_diff>